<commit_message>
some updates and additional background/thought questions on hands on
</commit_message>
<xml_diff>
--- a/docs/slides/3-performance.pptx
+++ b/docs/slides/3-performance.pptx
@@ -220,7 +220,7 @@
           <a:p>
             <a:fld id="{26C23BA1-C1FD-F54C-A91D-365911BB70A0}" type="datetimeFigureOut">
               <a:rPr lang="en-US" smtClean="0"/>
-              <a:t>10/4/22</a:t>
+              <a:t>10/6/22</a:t>
             </a:fld>
             <a:endParaRPr lang="en-US"/>
           </a:p>
@@ -5146,7 +5146,7 @@
           <a:p>
             <a:fld id="{6E174B13-2F4C-954D-BC49-D8D95C50C36E}" type="datetimeFigureOut">
               <a:rPr lang="en-US" smtClean="0"/>
-              <a:t>10/4/22</a:t>
+              <a:t>10/6/22</a:t>
             </a:fld>
             <a:endParaRPr lang="en-US"/>
           </a:p>
@@ -5344,7 +5344,7 @@
           <a:p>
             <a:fld id="{6E174B13-2F4C-954D-BC49-D8D95C50C36E}" type="datetimeFigureOut">
               <a:rPr lang="en-US" smtClean="0"/>
-              <a:t>10/4/22</a:t>
+              <a:t>10/6/22</a:t>
             </a:fld>
             <a:endParaRPr lang="en-US"/>
           </a:p>
@@ -5552,7 +5552,7 @@
           <a:p>
             <a:fld id="{6E174B13-2F4C-954D-BC49-D8D95C50C36E}" type="datetimeFigureOut">
               <a:rPr lang="en-US" smtClean="0"/>
-              <a:t>10/4/22</a:t>
+              <a:t>10/6/22</a:t>
             </a:fld>
             <a:endParaRPr lang="en-US"/>
           </a:p>
@@ -6402,7 +6402,7 @@
           <a:p>
             <a:fld id="{6E174B13-2F4C-954D-BC49-D8D95C50C36E}" type="datetimeFigureOut">
               <a:rPr lang="en-US" smtClean="0"/>
-              <a:t>10/4/22</a:t>
+              <a:t>10/6/22</a:t>
             </a:fld>
             <a:endParaRPr lang="en-US"/>
           </a:p>
@@ -6677,7 +6677,7 @@
           <a:p>
             <a:fld id="{6E174B13-2F4C-954D-BC49-D8D95C50C36E}" type="datetimeFigureOut">
               <a:rPr lang="en-US" smtClean="0"/>
-              <a:t>10/4/22</a:t>
+              <a:t>10/6/22</a:t>
             </a:fld>
             <a:endParaRPr lang="en-US"/>
           </a:p>
@@ -6942,7 +6942,7 @@
           <a:p>
             <a:fld id="{6E174B13-2F4C-954D-BC49-D8D95C50C36E}" type="datetimeFigureOut">
               <a:rPr lang="en-US" smtClean="0"/>
-              <a:t>10/4/22</a:t>
+              <a:t>10/6/22</a:t>
             </a:fld>
             <a:endParaRPr lang="en-US"/>
           </a:p>
@@ -7354,7 +7354,7 @@
           <a:p>
             <a:fld id="{6E174B13-2F4C-954D-BC49-D8D95C50C36E}" type="datetimeFigureOut">
               <a:rPr lang="en-US" smtClean="0"/>
-              <a:t>10/4/22</a:t>
+              <a:t>10/6/22</a:t>
             </a:fld>
             <a:endParaRPr lang="en-US"/>
           </a:p>
@@ -7495,7 +7495,7 @@
           <a:p>
             <a:fld id="{6E174B13-2F4C-954D-BC49-D8D95C50C36E}" type="datetimeFigureOut">
               <a:rPr lang="en-US" smtClean="0"/>
-              <a:t>10/4/22</a:t>
+              <a:t>10/6/22</a:t>
             </a:fld>
             <a:endParaRPr lang="en-US"/>
           </a:p>
@@ -7608,7 +7608,7 @@
           <a:p>
             <a:fld id="{6E174B13-2F4C-954D-BC49-D8D95C50C36E}" type="datetimeFigureOut">
               <a:rPr lang="en-US" smtClean="0"/>
-              <a:t>10/4/22</a:t>
+              <a:t>10/6/22</a:t>
             </a:fld>
             <a:endParaRPr lang="en-US"/>
           </a:p>
@@ -7919,7 +7919,7 @@
           <a:p>
             <a:fld id="{6E174B13-2F4C-954D-BC49-D8D95C50C36E}" type="datetimeFigureOut">
               <a:rPr lang="en-US" smtClean="0"/>
-              <a:t>10/4/22</a:t>
+              <a:t>10/6/22</a:t>
             </a:fld>
             <a:endParaRPr lang="en-US"/>
           </a:p>
@@ -8207,7 +8207,7 @@
           <a:p>
             <a:fld id="{6E174B13-2F4C-954D-BC49-D8D95C50C36E}" type="datetimeFigureOut">
               <a:rPr lang="en-US" smtClean="0"/>
-              <a:t>10/4/22</a:t>
+              <a:t>10/6/22</a:t>
             </a:fld>
             <a:endParaRPr lang="en-US"/>
           </a:p>
@@ -8448,7 +8448,7 @@
           <a:p>
             <a:fld id="{6E174B13-2F4C-954D-BC49-D8D95C50C36E}" type="datetimeFigureOut">
               <a:rPr lang="en-US" smtClean="0"/>
-              <a:t>10/4/22</a:t>
+              <a:t>10/6/22</a:t>
             </a:fld>
             <a:endParaRPr lang="en-US"/>
           </a:p>
@@ -14880,14 +14880,45 @@
           <a:lstStyle/>
           <a:p>
             <a:r>
-              <a:rPr lang="en" dirty="0">
+              <a:rPr lang="en" sz="3600" dirty="0">
                 <a:latin typeface="Open Sans" panose="020B0606030504020204" pitchFamily="34" charset="0"/>
                 <a:ea typeface="Open Sans" panose="020B0606030504020204" pitchFamily="34" charset="0"/>
                 <a:cs typeface="Open Sans" panose="020B0606030504020204" pitchFamily="34" charset="0"/>
               </a:rPr>
-              <a:t>Exercise 1 : Extracting features from network traffic</a:t>
-            </a:r>
-            <a:endParaRPr dirty="0">
+              <a:t>Hands-On</a:t>
+            </a:r>
+            <a:r>
+              <a:rPr lang="en" sz="3600">
+                <a:latin typeface="Open Sans" panose="020B0606030504020204" pitchFamily="34" charset="0"/>
+                <a:ea typeface="Open Sans" panose="020B0606030504020204" pitchFamily="34" charset="0"/>
+                <a:cs typeface="Open Sans" panose="020B0606030504020204" pitchFamily="34" charset="0"/>
+              </a:rPr>
+              <a:t>: </a:t>
+            </a:r>
+            <a:br>
+              <a:rPr lang="en" sz="3600">
+                <a:latin typeface="Open Sans" panose="020B0606030504020204" pitchFamily="34" charset="0"/>
+                <a:ea typeface="Open Sans" panose="020B0606030504020204" pitchFamily="34" charset="0"/>
+                <a:cs typeface="Open Sans" panose="020B0606030504020204" pitchFamily="34" charset="0"/>
+              </a:rPr>
+            </a:br>
+            <a:r>
+              <a:rPr lang="en" sz="3600">
+                <a:latin typeface="Open Sans" panose="020B0606030504020204" pitchFamily="34" charset="0"/>
+                <a:ea typeface="Open Sans" panose="020B0606030504020204" pitchFamily="34" charset="0"/>
+                <a:cs typeface="Open Sans" panose="020B0606030504020204" pitchFamily="34" charset="0"/>
+              </a:rPr>
+              <a:t>Extracting </a:t>
+            </a:r>
+            <a:r>
+              <a:rPr lang="en" sz="3600" dirty="0">
+                <a:latin typeface="Open Sans" panose="020B0606030504020204" pitchFamily="34" charset="0"/>
+                <a:ea typeface="Open Sans" panose="020B0606030504020204" pitchFamily="34" charset="0"/>
+                <a:cs typeface="Open Sans" panose="020B0606030504020204" pitchFamily="34" charset="0"/>
+              </a:rPr>
+              <a:t>Features from Network Traffic</a:t>
+            </a:r>
+            <a:endParaRPr sz="3600" dirty="0">
               <a:latin typeface="Open Sans" panose="020B0606030504020204" pitchFamily="34" charset="0"/>
               <a:ea typeface="Open Sans" panose="020B0606030504020204" pitchFamily="34" charset="0"/>
               <a:cs typeface="Open Sans" panose="020B0606030504020204" pitchFamily="34" charset="0"/>
@@ -14919,36 +14950,6 @@
             <a:noAutofit/>
           </a:bodyPr>
           <a:lstStyle/>
-          <a:p>
-            <a:pPr marL="0" indent="0">
-              <a:buNone/>
-            </a:pPr>
-            <a:r>
-              <a:rPr lang="en" sz="2400" u="sng" dirty="0">
-                <a:solidFill>
-                  <a:schemeClr val="hlink"/>
-                </a:solidFill>
-                <a:latin typeface="Open Sans" panose="020B0606030504020204" pitchFamily="34" charset="0"/>
-                <a:ea typeface="Open Sans" panose="020B0606030504020204" pitchFamily="34" charset="0"/>
-                <a:cs typeface="Open Sans" panose="020B0606030504020204" pitchFamily="34" charset="0"/>
-                <a:hlinkClick r:id="rId3"/>
-              </a:rPr>
-              <a:t>https://colab.research.google.com/drive/1SXfKNGJfLLb9J7WPf-IvKXXLrqT0khKb?usp=sharing</a:t>
-            </a:r>
-            <a:r>
-              <a:rPr lang="en" sz="2400" dirty="0">
-                <a:latin typeface="Open Sans" panose="020B0606030504020204" pitchFamily="34" charset="0"/>
-                <a:ea typeface="Open Sans" panose="020B0606030504020204" pitchFamily="34" charset="0"/>
-                <a:cs typeface="Open Sans" panose="020B0606030504020204" pitchFamily="34" charset="0"/>
-              </a:rPr>
-              <a:t> </a:t>
-            </a:r>
-            <a:endParaRPr sz="2400" dirty="0">
-              <a:latin typeface="Open Sans" panose="020B0606030504020204" pitchFamily="34" charset="0"/>
-              <a:ea typeface="Open Sans" panose="020B0606030504020204" pitchFamily="34" charset="0"/>
-              <a:cs typeface="Open Sans" panose="020B0606030504020204" pitchFamily="34" charset="0"/>
-            </a:endParaRPr>
-          </a:p>
           <a:p>
             <a:pPr marL="0" indent="0">
               <a:spcBef>

</xml_diff>